<commit_message>
adding light/dark templates presentation
</commit_message>
<xml_diff>
--- a/presentation templates/NaMi presentation - template dark.pptx
+++ b/presentation templates/NaMi presentation - template dark.pptx
@@ -766,10 +766,194 @@
       </p:grpSpPr>
       <p:sp>
         <p:nvSpPr>
-          <p:cNvPr id="2" name="Tytuł 1">
-            <a:extLst>
-              <a:ext uri="{FF2B5EF4-FFF2-40B4-BE49-F238E27FC236}">
-                <a16:creationId xmlns:a16="http://schemas.microsoft.com/office/drawing/2014/main" id="{91146556-2B4C-AC7C-0D99-792402884518}"/>
+          <p:cNvPr id="3" name="Symbol zastępczy zawartości 2">
+            <a:extLst>
+              <a:ext uri="{FF2B5EF4-FFF2-40B4-BE49-F238E27FC236}">
+                <a16:creationId xmlns:a16="http://schemas.microsoft.com/office/drawing/2014/main" id="{D22FFC0F-3F33-B709-2BB3-912B8F095B89}"/>
+              </a:ext>
+            </a:extLst>
+          </p:cNvPr>
+          <p:cNvSpPr>
+            <a:spLocks noGrp="1"/>
+          </p:cNvSpPr>
+          <p:nvPr>
+            <p:ph idx="1"/>
+          </p:nvPr>
+        </p:nvSpPr>
+        <p:spPr>
+          <a:xfrm>
+            <a:off x="177053" y="1835526"/>
+            <a:ext cx="6315635" cy="4351338"/>
+          </a:xfrm>
+        </p:spPr>
+        <p:txBody>
+          <a:bodyPr/>
+          <a:lstStyle/>
+          <a:p>
+            <a:pPr lvl="0"/>
+            <a:r>
+              <a:rPr lang="pl-PL" dirty="0"/>
+              <a:t>Kliknij, aby edytować style wzorca tekstu</a:t>
+            </a:r>
+          </a:p>
+          <a:p>
+            <a:pPr lvl="1"/>
+            <a:r>
+              <a:rPr lang="pl-PL" dirty="0"/>
+              <a:t>Drugi poziom</a:t>
+            </a:r>
+          </a:p>
+          <a:p>
+            <a:pPr lvl="2"/>
+            <a:r>
+              <a:rPr lang="pl-PL" dirty="0"/>
+              <a:t>Trzeci poziom</a:t>
+            </a:r>
+          </a:p>
+          <a:p>
+            <a:pPr lvl="3"/>
+            <a:r>
+              <a:rPr lang="pl-PL" dirty="0"/>
+              <a:t>Czwarty poziom</a:t>
+            </a:r>
+          </a:p>
+          <a:p>
+            <a:pPr lvl="4"/>
+            <a:r>
+              <a:rPr lang="pl-PL" dirty="0"/>
+              <a:t>Piąty poziom</a:t>
+            </a:r>
+          </a:p>
+        </p:txBody>
+      </p:sp>
+      <p:sp>
+        <p:nvSpPr>
+          <p:cNvPr id="4" name="Symbol zastępczy daty 3">
+            <a:extLst>
+              <a:ext uri="{FF2B5EF4-FFF2-40B4-BE49-F238E27FC236}">
+                <a16:creationId xmlns:a16="http://schemas.microsoft.com/office/drawing/2014/main" id="{89061958-D8A2-7378-C34F-4CC2F46C82C9}"/>
+              </a:ext>
+            </a:extLst>
+          </p:cNvPr>
+          <p:cNvSpPr>
+            <a:spLocks noGrp="1"/>
+          </p:cNvSpPr>
+          <p:nvPr>
+            <p:ph type="dt" sz="half" idx="10"/>
+          </p:nvPr>
+        </p:nvSpPr>
+        <p:spPr/>
+        <p:txBody>
+          <a:bodyPr/>
+          <a:lstStyle/>
+          <a:p>
+            <a:fld id="{E9953649-E40E-4313-B1F4-6EFEC4D75A1C}" type="datetimeFigureOut">
+              <a:rPr lang="pl-PL" smtClean="0"/>
+              <a:t>15.11.2025</a:t>
+            </a:fld>
+            <a:endParaRPr lang="pl-PL"/>
+          </a:p>
+        </p:txBody>
+      </p:sp>
+      <p:sp>
+        <p:nvSpPr>
+          <p:cNvPr id="5" name="Symbol zastępczy stopki 4">
+            <a:extLst>
+              <a:ext uri="{FF2B5EF4-FFF2-40B4-BE49-F238E27FC236}">
+                <a16:creationId xmlns:a16="http://schemas.microsoft.com/office/drawing/2014/main" id="{FB75CC14-31C1-B6E4-57E0-132328FB658F}"/>
+              </a:ext>
+            </a:extLst>
+          </p:cNvPr>
+          <p:cNvSpPr>
+            <a:spLocks noGrp="1"/>
+          </p:cNvSpPr>
+          <p:nvPr>
+            <p:ph type="ftr" sz="quarter" idx="11"/>
+          </p:nvPr>
+        </p:nvSpPr>
+        <p:spPr/>
+        <p:txBody>
+          <a:bodyPr/>
+          <a:lstStyle/>
+          <a:p>
+            <a:endParaRPr lang="pl-PL"/>
+          </a:p>
+        </p:txBody>
+      </p:sp>
+      <p:sp>
+        <p:nvSpPr>
+          <p:cNvPr id="6" name="Symbol zastępczy numeru slajdu 5">
+            <a:extLst>
+              <a:ext uri="{FF2B5EF4-FFF2-40B4-BE49-F238E27FC236}">
+                <a16:creationId xmlns:a16="http://schemas.microsoft.com/office/drawing/2014/main" id="{20B1F163-7688-C45F-87B4-F1EB3BA8396D}"/>
+              </a:ext>
+            </a:extLst>
+          </p:cNvPr>
+          <p:cNvSpPr>
+            <a:spLocks noGrp="1"/>
+          </p:cNvSpPr>
+          <p:nvPr>
+            <p:ph type="sldNum" sz="quarter" idx="12"/>
+          </p:nvPr>
+        </p:nvSpPr>
+        <p:spPr/>
+        <p:txBody>
+          <a:bodyPr/>
+          <a:lstStyle/>
+          <a:p>
+            <a:fld id="{BB8932C1-12B8-442F-A6DE-20ED8AA5BFFC}" type="slidenum">
+              <a:rPr lang="pl-PL" smtClean="0"/>
+              <a:t>‹#›</a:t>
+            </a:fld>
+            <a:endParaRPr lang="pl-PL"/>
+          </a:p>
+        </p:txBody>
+      </p:sp>
+      <p:sp>
+        <p:nvSpPr>
+          <p:cNvPr id="8" name="Symbol zastępczy zawartości 2">
+            <a:extLst>
+              <a:ext uri="{FF2B5EF4-FFF2-40B4-BE49-F238E27FC236}">
+                <a16:creationId xmlns:a16="http://schemas.microsoft.com/office/drawing/2014/main" id="{3F27D1EF-8119-317E-4771-6B45D1193B83}"/>
+              </a:ext>
+            </a:extLst>
+          </p:cNvPr>
+          <p:cNvSpPr>
+            <a:spLocks noGrp="1"/>
+          </p:cNvSpPr>
+          <p:nvPr>
+            <p:ph idx="13" hasCustomPrompt="1"/>
+          </p:nvPr>
+        </p:nvSpPr>
+        <p:spPr>
+          <a:xfrm>
+            <a:off x="6939913" y="1835526"/>
+            <a:ext cx="5075034" cy="4351338"/>
+          </a:xfrm>
+        </p:spPr>
+        <p:txBody>
+          <a:bodyPr/>
+          <a:lstStyle>
+            <a:lvl1pPr>
+              <a:buNone/>
+              <a:defRPr/>
+            </a:lvl1pPr>
+          </a:lstStyle>
+          <a:p>
+            <a:pPr lvl="0"/>
+            <a:r>
+              <a:rPr lang="pl-PL" dirty="0"/>
+              <a:t>Grafika – edytuj wedle wizji</a:t>
+            </a:r>
+          </a:p>
+        </p:txBody>
+      </p:sp>
+      <p:sp>
+        <p:nvSpPr>
+          <p:cNvPr id="13" name="Symbol zastępczy tytułu 1">
+            <a:extLst>
+              <a:ext uri="{FF2B5EF4-FFF2-40B4-BE49-F238E27FC236}">
+                <a16:creationId xmlns:a16="http://schemas.microsoft.com/office/drawing/2014/main" id="{C857FBED-C533-57DC-507D-F056AC27FFAB}"/>
               </a:ext>
             </a:extLst>
           </p:cNvPr>
@@ -780,9 +964,19 @@
             <p:ph type="title" hasCustomPrompt="1"/>
           </p:nvPr>
         </p:nvSpPr>
-        <p:spPr/>
-        <p:txBody>
-          <a:bodyPr/>
+        <p:spPr>
+          <a:xfrm>
+            <a:off x="177053" y="136525"/>
+            <a:ext cx="11837894" cy="1325563"/>
+          </a:xfrm>
+          <a:prstGeom prst="rect">
+            <a:avLst/>
+          </a:prstGeom>
+        </p:spPr>
+        <p:txBody>
+          <a:bodyPr vert="horz" lIns="91440" tIns="45720" rIns="91440" bIns="45720" rtlCol="0" anchor="ctr">
+            <a:noAutofit/>
+          </a:bodyPr>
           <a:lstStyle>
             <a:lvl1pPr>
               <a:defRPr/>
@@ -791,191 +985,7 @@
           <a:p>
             <a:r>
               <a:rPr lang="pl-PL" dirty="0"/>
-              <a:t>Tytuł sekcji – Pin point </a:t>
-            </a:r>
-          </a:p>
-        </p:txBody>
-      </p:sp>
-      <p:sp>
-        <p:nvSpPr>
-          <p:cNvPr id="3" name="Symbol zastępczy zawartości 2">
-            <a:extLst>
-              <a:ext uri="{FF2B5EF4-FFF2-40B4-BE49-F238E27FC236}">
-                <a16:creationId xmlns:a16="http://schemas.microsoft.com/office/drawing/2014/main" id="{D22FFC0F-3F33-B709-2BB3-912B8F095B89}"/>
-              </a:ext>
-            </a:extLst>
-          </p:cNvPr>
-          <p:cNvSpPr>
-            <a:spLocks noGrp="1"/>
-          </p:cNvSpPr>
-          <p:nvPr>
-            <p:ph idx="1"/>
-          </p:nvPr>
-        </p:nvSpPr>
-        <p:spPr>
-          <a:xfrm>
-            <a:off x="838200" y="1825625"/>
-            <a:ext cx="5158740" cy="4351338"/>
-          </a:xfrm>
-        </p:spPr>
-        <p:txBody>
-          <a:bodyPr/>
-          <a:lstStyle/>
-          <a:p>
-            <a:pPr lvl="0"/>
-            <a:r>
-              <a:rPr lang="pl-PL" dirty="0"/>
-              <a:t>Kliknij, aby edytować style wzorca tekstu</a:t>
-            </a:r>
-          </a:p>
-          <a:p>
-            <a:pPr lvl="1"/>
-            <a:r>
-              <a:rPr lang="pl-PL" dirty="0"/>
-              <a:t>Drugi poziom</a:t>
-            </a:r>
-          </a:p>
-          <a:p>
-            <a:pPr lvl="2"/>
-            <a:r>
-              <a:rPr lang="pl-PL" dirty="0"/>
-              <a:t>Trzeci poziom</a:t>
-            </a:r>
-          </a:p>
-          <a:p>
-            <a:pPr lvl="3"/>
-            <a:r>
-              <a:rPr lang="pl-PL" dirty="0"/>
-              <a:t>Czwarty poziom</a:t>
-            </a:r>
-          </a:p>
-          <a:p>
-            <a:pPr lvl="4"/>
-            <a:r>
-              <a:rPr lang="pl-PL" dirty="0"/>
-              <a:t>Piąty poziom</a:t>
-            </a:r>
-          </a:p>
-        </p:txBody>
-      </p:sp>
-      <p:sp>
-        <p:nvSpPr>
-          <p:cNvPr id="4" name="Symbol zastępczy daty 3">
-            <a:extLst>
-              <a:ext uri="{FF2B5EF4-FFF2-40B4-BE49-F238E27FC236}">
-                <a16:creationId xmlns:a16="http://schemas.microsoft.com/office/drawing/2014/main" id="{89061958-D8A2-7378-C34F-4CC2F46C82C9}"/>
-              </a:ext>
-            </a:extLst>
-          </p:cNvPr>
-          <p:cNvSpPr>
-            <a:spLocks noGrp="1"/>
-          </p:cNvSpPr>
-          <p:nvPr>
-            <p:ph type="dt" sz="half" idx="10"/>
-          </p:nvPr>
-        </p:nvSpPr>
-        <p:spPr/>
-        <p:txBody>
-          <a:bodyPr/>
-          <a:lstStyle/>
-          <a:p>
-            <a:fld id="{E9953649-E40E-4313-B1F4-6EFEC4D75A1C}" type="datetimeFigureOut">
-              <a:rPr lang="pl-PL" smtClean="0"/>
-              <a:t>15.11.2025</a:t>
-            </a:fld>
-            <a:endParaRPr lang="pl-PL"/>
-          </a:p>
-        </p:txBody>
-      </p:sp>
-      <p:sp>
-        <p:nvSpPr>
-          <p:cNvPr id="5" name="Symbol zastępczy stopki 4">
-            <a:extLst>
-              <a:ext uri="{FF2B5EF4-FFF2-40B4-BE49-F238E27FC236}">
-                <a16:creationId xmlns:a16="http://schemas.microsoft.com/office/drawing/2014/main" id="{FB75CC14-31C1-B6E4-57E0-132328FB658F}"/>
-              </a:ext>
-            </a:extLst>
-          </p:cNvPr>
-          <p:cNvSpPr>
-            <a:spLocks noGrp="1"/>
-          </p:cNvSpPr>
-          <p:nvPr>
-            <p:ph type="ftr" sz="quarter" idx="11"/>
-          </p:nvPr>
-        </p:nvSpPr>
-        <p:spPr/>
-        <p:txBody>
-          <a:bodyPr/>
-          <a:lstStyle/>
-          <a:p>
-            <a:endParaRPr lang="pl-PL"/>
-          </a:p>
-        </p:txBody>
-      </p:sp>
-      <p:sp>
-        <p:nvSpPr>
-          <p:cNvPr id="6" name="Symbol zastępczy numeru slajdu 5">
-            <a:extLst>
-              <a:ext uri="{FF2B5EF4-FFF2-40B4-BE49-F238E27FC236}">
-                <a16:creationId xmlns:a16="http://schemas.microsoft.com/office/drawing/2014/main" id="{20B1F163-7688-C45F-87B4-F1EB3BA8396D}"/>
-              </a:ext>
-            </a:extLst>
-          </p:cNvPr>
-          <p:cNvSpPr>
-            <a:spLocks noGrp="1"/>
-          </p:cNvSpPr>
-          <p:nvPr>
-            <p:ph type="sldNum" sz="quarter" idx="12"/>
-          </p:nvPr>
-        </p:nvSpPr>
-        <p:spPr/>
-        <p:txBody>
-          <a:bodyPr/>
-          <a:lstStyle/>
-          <a:p>
-            <a:fld id="{BB8932C1-12B8-442F-A6DE-20ED8AA5BFFC}" type="slidenum">
-              <a:rPr lang="pl-PL" smtClean="0"/>
-              <a:t>‹#›</a:t>
-            </a:fld>
-            <a:endParaRPr lang="pl-PL"/>
-          </a:p>
-        </p:txBody>
-      </p:sp>
-      <p:sp>
-        <p:nvSpPr>
-          <p:cNvPr id="8" name="Symbol zastępczy zawartości 2">
-            <a:extLst>
-              <a:ext uri="{FF2B5EF4-FFF2-40B4-BE49-F238E27FC236}">
-                <a16:creationId xmlns:a16="http://schemas.microsoft.com/office/drawing/2014/main" id="{3F27D1EF-8119-317E-4771-6B45D1193B83}"/>
-              </a:ext>
-            </a:extLst>
-          </p:cNvPr>
-          <p:cNvSpPr>
-            <a:spLocks noGrp="1"/>
-          </p:cNvSpPr>
-          <p:nvPr>
-            <p:ph idx="13" hasCustomPrompt="1"/>
-          </p:nvPr>
-        </p:nvSpPr>
-        <p:spPr>
-          <a:xfrm>
-            <a:off x="6195060" y="1825625"/>
-            <a:ext cx="5158740" cy="4351338"/>
-          </a:xfrm>
-        </p:spPr>
-        <p:txBody>
-          <a:bodyPr/>
-          <a:lstStyle>
-            <a:lvl1pPr>
-              <a:buNone/>
-              <a:defRPr/>
-            </a:lvl1pPr>
-          </a:lstStyle>
-          <a:p>
-            <a:pPr lvl="0"/>
-            <a:r>
-              <a:rPr lang="pl-PL" dirty="0"/>
-              <a:t>Grafika – edytuj wedle wizji</a:t>
+              <a:t>TYTUL SEKCJI – PIN POINT</a:t>
             </a:r>
           </a:p>
         </p:txBody>
@@ -1293,7 +1303,7 @@
 </file>
 
 <file path=ppt/slideLayouts/slideLayout4.xml><?xml version="1.0" encoding="utf-8"?>
-<p:sldLayout xmlns:a="http://schemas.openxmlformats.org/drawingml/2006/main" xmlns:r="http://schemas.openxmlformats.org/officeDocument/2006/relationships" xmlns:p="http://schemas.openxmlformats.org/presentationml/2006/main" type="twoObj" preserve="1">
+<p:sldLayout xmlns:a="http://schemas.openxmlformats.org/drawingml/2006/main" xmlns:r="http://schemas.openxmlformats.org/officeDocument/2006/relationships" xmlns:p="http://schemas.openxmlformats.org/presentationml/2006/main" preserve="1" userDrawn="1">
   <p:cSld name="Dwa elementy zawartości">
     <p:spTree>
       <p:nvGrpSpPr>
@@ -1311,10 +1321,93 @@
       </p:grpSpPr>
       <p:sp>
         <p:nvSpPr>
-          <p:cNvPr id="2" name="Tytuł 1">
-            <a:extLst>
-              <a:ext uri="{FF2B5EF4-FFF2-40B4-BE49-F238E27FC236}">
-                <a16:creationId xmlns:a16="http://schemas.microsoft.com/office/drawing/2014/main" id="{5000BAD6-8E13-A0B4-5505-87A7A5AFB8EC}"/>
+          <p:cNvPr id="5" name="Symbol zastępczy daty 4">
+            <a:extLst>
+              <a:ext uri="{FF2B5EF4-FFF2-40B4-BE49-F238E27FC236}">
+                <a16:creationId xmlns:a16="http://schemas.microsoft.com/office/drawing/2014/main" id="{8706BC6A-3A80-5EBF-72A0-6C78175D8EDC}"/>
+              </a:ext>
+            </a:extLst>
+          </p:cNvPr>
+          <p:cNvSpPr>
+            <a:spLocks noGrp="1"/>
+          </p:cNvSpPr>
+          <p:nvPr>
+            <p:ph type="dt" sz="half" idx="10"/>
+          </p:nvPr>
+        </p:nvSpPr>
+        <p:spPr/>
+        <p:txBody>
+          <a:bodyPr/>
+          <a:lstStyle/>
+          <a:p>
+            <a:fld id="{E9953649-E40E-4313-B1F4-6EFEC4D75A1C}" type="datetimeFigureOut">
+              <a:rPr lang="pl-PL" smtClean="0"/>
+              <a:t>15.11.2025</a:t>
+            </a:fld>
+            <a:endParaRPr lang="pl-PL"/>
+          </a:p>
+        </p:txBody>
+      </p:sp>
+      <p:sp>
+        <p:nvSpPr>
+          <p:cNvPr id="6" name="Symbol zastępczy stopki 5">
+            <a:extLst>
+              <a:ext uri="{FF2B5EF4-FFF2-40B4-BE49-F238E27FC236}">
+                <a16:creationId xmlns:a16="http://schemas.microsoft.com/office/drawing/2014/main" id="{A7571842-D1D9-9FF0-B08B-F1477BC95FF3}"/>
+              </a:ext>
+            </a:extLst>
+          </p:cNvPr>
+          <p:cNvSpPr>
+            <a:spLocks noGrp="1"/>
+          </p:cNvSpPr>
+          <p:nvPr>
+            <p:ph type="ftr" sz="quarter" idx="11"/>
+          </p:nvPr>
+        </p:nvSpPr>
+        <p:spPr/>
+        <p:txBody>
+          <a:bodyPr/>
+          <a:lstStyle/>
+          <a:p>
+            <a:endParaRPr lang="pl-PL"/>
+          </a:p>
+        </p:txBody>
+      </p:sp>
+      <p:sp>
+        <p:nvSpPr>
+          <p:cNvPr id="7" name="Symbol zastępczy numeru slajdu 6">
+            <a:extLst>
+              <a:ext uri="{FF2B5EF4-FFF2-40B4-BE49-F238E27FC236}">
+                <a16:creationId xmlns:a16="http://schemas.microsoft.com/office/drawing/2014/main" id="{32B7AACC-985D-0705-700A-C00D761ED5A5}"/>
+              </a:ext>
+            </a:extLst>
+          </p:cNvPr>
+          <p:cNvSpPr>
+            <a:spLocks noGrp="1"/>
+          </p:cNvSpPr>
+          <p:nvPr>
+            <p:ph type="sldNum" sz="quarter" idx="12"/>
+          </p:nvPr>
+        </p:nvSpPr>
+        <p:spPr/>
+        <p:txBody>
+          <a:bodyPr/>
+          <a:lstStyle/>
+          <a:p>
+            <a:fld id="{BB8932C1-12B8-442F-A6DE-20ED8AA5BFFC}" type="slidenum">
+              <a:rPr lang="pl-PL" smtClean="0"/>
+              <a:t>‹#›</a:t>
+            </a:fld>
+            <a:endParaRPr lang="pl-PL"/>
+          </a:p>
+        </p:txBody>
+      </p:sp>
+      <p:sp>
+        <p:nvSpPr>
+          <p:cNvPr id="10" name="Symbol zastępczy tytułu 1">
+            <a:extLst>
+              <a:ext uri="{FF2B5EF4-FFF2-40B4-BE49-F238E27FC236}">
+                <a16:creationId xmlns:a16="http://schemas.microsoft.com/office/drawing/2014/main" id="{27BEE551-17FC-C55A-1050-D1E0C0AF1BBE}"/>
               </a:ext>
             </a:extLst>
           </p:cNvPr>
@@ -1325,9 +1418,19 @@
             <p:ph type="title" hasCustomPrompt="1"/>
           </p:nvPr>
         </p:nvSpPr>
-        <p:spPr/>
-        <p:txBody>
-          <a:bodyPr/>
+        <p:spPr>
+          <a:xfrm>
+            <a:off x="177053" y="136525"/>
+            <a:ext cx="11837894" cy="1325563"/>
+          </a:xfrm>
+          <a:prstGeom prst="rect">
+            <a:avLst/>
+          </a:prstGeom>
+        </p:spPr>
+        <p:txBody>
+          <a:bodyPr vert="horz" lIns="91440" tIns="45720" rIns="91440" bIns="45720" rtlCol="0" anchor="ctr">
+            <a:noAutofit/>
+          </a:bodyPr>
           <a:lstStyle>
             <a:lvl1pPr>
               <a:defRPr/>
@@ -1336,31 +1439,31 @@
           <a:p>
             <a:r>
               <a:rPr lang="pl-PL" dirty="0"/>
-              <a:t>Tytuł - porównanie</a:t>
-            </a:r>
-          </a:p>
-        </p:txBody>
-      </p:sp>
-      <p:sp>
-        <p:nvSpPr>
-          <p:cNvPr id="3" name="Symbol zastępczy zawartości 2">
-            <a:extLst>
-              <a:ext uri="{FF2B5EF4-FFF2-40B4-BE49-F238E27FC236}">
-                <a16:creationId xmlns:a16="http://schemas.microsoft.com/office/drawing/2014/main" id="{BFFACA03-D9D8-35D3-23B5-E4AEC96B0C3D}"/>
-              </a:ext>
-            </a:extLst>
-          </p:cNvPr>
-          <p:cNvSpPr>
-            <a:spLocks noGrp="1"/>
-          </p:cNvSpPr>
-          <p:nvPr>
-            <p:ph sz="half" idx="1"/>
+              <a:t>TYTUL SEKCJI – COMPARE</a:t>
+            </a:r>
+          </a:p>
+        </p:txBody>
+      </p:sp>
+      <p:sp>
+        <p:nvSpPr>
+          <p:cNvPr id="12" name="Symbol zastępczy zawartości 2">
+            <a:extLst>
+              <a:ext uri="{FF2B5EF4-FFF2-40B4-BE49-F238E27FC236}">
+                <a16:creationId xmlns:a16="http://schemas.microsoft.com/office/drawing/2014/main" id="{BB9841AD-94DF-BBB2-89F2-969AFCF64CBD}"/>
+              </a:ext>
+            </a:extLst>
+          </p:cNvPr>
+          <p:cNvSpPr>
+            <a:spLocks noGrp="1"/>
+          </p:cNvSpPr>
+          <p:nvPr>
+            <p:ph idx="14"/>
           </p:nvPr>
         </p:nvSpPr>
         <p:spPr>
           <a:xfrm>
-            <a:off x="838200" y="1825625"/>
-            <a:ext cx="5181600" cy="4351338"/>
+            <a:off x="177054" y="1852706"/>
+            <a:ext cx="5664138" cy="4334158"/>
           </a:xfrm>
         </p:spPr>
         <p:txBody>
@@ -1369,35 +1472,35 @@
           <a:p>
             <a:pPr lvl="0"/>
             <a:r>
-              <a:rPr lang="pl-PL"/>
+              <a:rPr lang="pl-PL" dirty="0"/>
               <a:t>Kliknij, aby edytować style wzorca tekstu</a:t>
             </a:r>
           </a:p>
           <a:p>
             <a:pPr lvl="1"/>
             <a:r>
-              <a:rPr lang="pl-PL"/>
+              <a:rPr lang="pl-PL" dirty="0"/>
               <a:t>Drugi poziom</a:t>
             </a:r>
           </a:p>
           <a:p>
             <a:pPr lvl="2"/>
             <a:r>
-              <a:rPr lang="pl-PL"/>
+              <a:rPr lang="pl-PL" dirty="0"/>
               <a:t>Trzeci poziom</a:t>
             </a:r>
           </a:p>
           <a:p>
             <a:pPr lvl="3"/>
             <a:r>
-              <a:rPr lang="pl-PL"/>
+              <a:rPr lang="pl-PL" dirty="0"/>
               <a:t>Czwarty poziom</a:t>
             </a:r>
           </a:p>
           <a:p>
             <a:pPr lvl="4"/>
             <a:r>
-              <a:rPr lang="pl-PL"/>
+              <a:rPr lang="pl-PL" dirty="0"/>
               <a:t>Piąty poziom</a:t>
             </a:r>
           </a:p>
@@ -1405,24 +1508,24 @@
       </p:sp>
       <p:sp>
         <p:nvSpPr>
-          <p:cNvPr id="4" name="Symbol zastępczy zawartości 3">
-            <a:extLst>
-              <a:ext uri="{FF2B5EF4-FFF2-40B4-BE49-F238E27FC236}">
-                <a16:creationId xmlns:a16="http://schemas.microsoft.com/office/drawing/2014/main" id="{BF8895CF-C613-E83D-708A-F35D5A43CBFA}"/>
-              </a:ext>
-            </a:extLst>
-          </p:cNvPr>
-          <p:cNvSpPr>
-            <a:spLocks noGrp="1"/>
-          </p:cNvSpPr>
-          <p:nvPr>
-            <p:ph sz="half" idx="2"/>
+          <p:cNvPr id="13" name="Symbol zastępczy zawartości 2">
+            <a:extLst>
+              <a:ext uri="{FF2B5EF4-FFF2-40B4-BE49-F238E27FC236}">
+                <a16:creationId xmlns:a16="http://schemas.microsoft.com/office/drawing/2014/main" id="{8DBE9BBF-7E21-C3B4-B3A2-CCB446E18A23}"/>
+              </a:ext>
+            </a:extLst>
+          </p:cNvPr>
+          <p:cNvSpPr>
+            <a:spLocks noGrp="1"/>
+          </p:cNvSpPr>
+          <p:nvPr>
+            <p:ph idx="15"/>
           </p:nvPr>
         </p:nvSpPr>
         <p:spPr>
           <a:xfrm>
-            <a:off x="6172200" y="1825625"/>
-            <a:ext cx="5181600" cy="4351338"/>
+            <a:off x="6350807" y="1852706"/>
+            <a:ext cx="5664138" cy="4334158"/>
           </a:xfrm>
         </p:spPr>
         <p:txBody>
@@ -1431,120 +1534,37 @@
           <a:p>
             <a:pPr lvl="0"/>
             <a:r>
-              <a:rPr lang="pl-PL"/>
+              <a:rPr lang="pl-PL" dirty="0"/>
               <a:t>Kliknij, aby edytować style wzorca tekstu</a:t>
             </a:r>
           </a:p>
           <a:p>
             <a:pPr lvl="1"/>
             <a:r>
-              <a:rPr lang="pl-PL"/>
+              <a:rPr lang="pl-PL" dirty="0"/>
               <a:t>Drugi poziom</a:t>
             </a:r>
           </a:p>
           <a:p>
             <a:pPr lvl="2"/>
             <a:r>
-              <a:rPr lang="pl-PL"/>
+              <a:rPr lang="pl-PL" dirty="0"/>
               <a:t>Trzeci poziom</a:t>
             </a:r>
           </a:p>
           <a:p>
             <a:pPr lvl="3"/>
             <a:r>
-              <a:rPr lang="pl-PL"/>
+              <a:rPr lang="pl-PL" dirty="0"/>
               <a:t>Czwarty poziom</a:t>
             </a:r>
           </a:p>
           <a:p>
             <a:pPr lvl="4"/>
             <a:r>
-              <a:rPr lang="pl-PL"/>
+              <a:rPr lang="pl-PL" dirty="0"/>
               <a:t>Piąty poziom</a:t>
             </a:r>
-          </a:p>
-        </p:txBody>
-      </p:sp>
-      <p:sp>
-        <p:nvSpPr>
-          <p:cNvPr id="5" name="Symbol zastępczy daty 4">
-            <a:extLst>
-              <a:ext uri="{FF2B5EF4-FFF2-40B4-BE49-F238E27FC236}">
-                <a16:creationId xmlns:a16="http://schemas.microsoft.com/office/drawing/2014/main" id="{8706BC6A-3A80-5EBF-72A0-6C78175D8EDC}"/>
-              </a:ext>
-            </a:extLst>
-          </p:cNvPr>
-          <p:cNvSpPr>
-            <a:spLocks noGrp="1"/>
-          </p:cNvSpPr>
-          <p:nvPr>
-            <p:ph type="dt" sz="half" idx="10"/>
-          </p:nvPr>
-        </p:nvSpPr>
-        <p:spPr/>
-        <p:txBody>
-          <a:bodyPr/>
-          <a:lstStyle/>
-          <a:p>
-            <a:fld id="{E9953649-E40E-4313-B1F4-6EFEC4D75A1C}" type="datetimeFigureOut">
-              <a:rPr lang="pl-PL" smtClean="0"/>
-              <a:t>15.11.2025</a:t>
-            </a:fld>
-            <a:endParaRPr lang="pl-PL"/>
-          </a:p>
-        </p:txBody>
-      </p:sp>
-      <p:sp>
-        <p:nvSpPr>
-          <p:cNvPr id="6" name="Symbol zastępczy stopki 5">
-            <a:extLst>
-              <a:ext uri="{FF2B5EF4-FFF2-40B4-BE49-F238E27FC236}">
-                <a16:creationId xmlns:a16="http://schemas.microsoft.com/office/drawing/2014/main" id="{A7571842-D1D9-9FF0-B08B-F1477BC95FF3}"/>
-              </a:ext>
-            </a:extLst>
-          </p:cNvPr>
-          <p:cNvSpPr>
-            <a:spLocks noGrp="1"/>
-          </p:cNvSpPr>
-          <p:nvPr>
-            <p:ph type="ftr" sz="quarter" idx="11"/>
-          </p:nvPr>
-        </p:nvSpPr>
-        <p:spPr/>
-        <p:txBody>
-          <a:bodyPr/>
-          <a:lstStyle/>
-          <a:p>
-            <a:endParaRPr lang="pl-PL"/>
-          </a:p>
-        </p:txBody>
-      </p:sp>
-      <p:sp>
-        <p:nvSpPr>
-          <p:cNvPr id="7" name="Symbol zastępczy numeru slajdu 6">
-            <a:extLst>
-              <a:ext uri="{FF2B5EF4-FFF2-40B4-BE49-F238E27FC236}">
-                <a16:creationId xmlns:a16="http://schemas.microsoft.com/office/drawing/2014/main" id="{32B7AACC-985D-0705-700A-C00D761ED5A5}"/>
-              </a:ext>
-            </a:extLst>
-          </p:cNvPr>
-          <p:cNvSpPr>
-            <a:spLocks noGrp="1"/>
-          </p:cNvSpPr>
-          <p:nvPr>
-            <p:ph type="sldNum" sz="quarter" idx="12"/>
-          </p:nvPr>
-        </p:nvSpPr>
-        <p:spPr/>
-        <p:txBody>
-          <a:bodyPr/>
-          <a:lstStyle/>
-          <a:p>
-            <a:fld id="{BB8932C1-12B8-442F-A6DE-20ED8AA5BFFC}" type="slidenum">
-              <a:rPr lang="pl-PL" smtClean="0"/>
-              <a:t>‹#›</a:t>
-            </a:fld>
-            <a:endParaRPr lang="pl-PL"/>
           </a:p>
         </p:txBody>
       </p:sp>
@@ -1574,7 +1594,7 @@
 </file>
 
 <file path=ppt/slideLayouts/slideLayout5.xml><?xml version="1.0" encoding="utf-8"?>
-<p:sldLayout xmlns:a="http://schemas.openxmlformats.org/drawingml/2006/main" xmlns:r="http://schemas.openxmlformats.org/officeDocument/2006/relationships" xmlns:p="http://schemas.openxmlformats.org/presentationml/2006/main" type="twoTxTwoObj" preserve="1">
+<p:sldLayout xmlns:a="http://schemas.openxmlformats.org/drawingml/2006/main" xmlns:r="http://schemas.openxmlformats.org/officeDocument/2006/relationships" xmlns:p="http://schemas.openxmlformats.org/presentationml/2006/main" preserve="1" userDrawn="1">
   <p:cSld name="Porównanie">
     <p:spTree>
       <p:nvGrpSpPr>
@@ -1592,65 +1612,24 @@
       </p:grpSpPr>
       <p:sp>
         <p:nvSpPr>
-          <p:cNvPr id="2" name="Tytuł 1">
-            <a:extLst>
-              <a:ext uri="{FF2B5EF4-FFF2-40B4-BE49-F238E27FC236}">
-                <a16:creationId xmlns:a16="http://schemas.microsoft.com/office/drawing/2014/main" id="{6A74ECDA-B4BB-BB08-5724-E1B85C3B9E93}"/>
-              </a:ext>
-            </a:extLst>
-          </p:cNvPr>
-          <p:cNvSpPr>
-            <a:spLocks noGrp="1"/>
-          </p:cNvSpPr>
-          <p:nvPr>
-            <p:ph type="title"/>
+          <p:cNvPr id="3" name="Symbol zastępczy tekstu 2">
+            <a:extLst>
+              <a:ext uri="{FF2B5EF4-FFF2-40B4-BE49-F238E27FC236}">
+                <a16:creationId xmlns:a16="http://schemas.microsoft.com/office/drawing/2014/main" id="{DC9B7815-4FED-3CE6-0368-ECA51F37E307}"/>
+              </a:ext>
+            </a:extLst>
+          </p:cNvPr>
+          <p:cNvSpPr>
+            <a:spLocks noGrp="1"/>
+          </p:cNvSpPr>
+          <p:nvPr>
+            <p:ph type="body" idx="1"/>
           </p:nvPr>
         </p:nvSpPr>
         <p:spPr>
           <a:xfrm>
-            <a:off x="839788" y="365125"/>
-            <a:ext cx="10515600" cy="1325563"/>
-          </a:xfrm>
-        </p:spPr>
-        <p:txBody>
-          <a:bodyPr/>
-          <a:lstStyle>
-            <a:lvl1pPr>
-              <a:defRPr>
-                <a:solidFill>
-                  <a:srgbClr val="081F3E"/>
-                </a:solidFill>
-              </a:defRPr>
-            </a:lvl1pPr>
-          </a:lstStyle>
-          <a:p>
-            <a:r>
-              <a:rPr lang="pl-PL" dirty="0"/>
-              <a:t>Kliknij, aby edytować styl</a:t>
-            </a:r>
-          </a:p>
-        </p:txBody>
-      </p:sp>
-      <p:sp>
-        <p:nvSpPr>
-          <p:cNvPr id="3" name="Symbol zastępczy tekstu 2">
-            <a:extLst>
-              <a:ext uri="{FF2B5EF4-FFF2-40B4-BE49-F238E27FC236}">
-                <a16:creationId xmlns:a16="http://schemas.microsoft.com/office/drawing/2014/main" id="{DC9B7815-4FED-3CE6-0368-ECA51F37E307}"/>
-              </a:ext>
-            </a:extLst>
-          </p:cNvPr>
-          <p:cNvSpPr>
-            <a:spLocks noGrp="1"/>
-          </p:cNvSpPr>
-          <p:nvPr>
-            <p:ph type="body" idx="1"/>
-          </p:nvPr>
-        </p:nvSpPr>
-        <p:spPr>
-          <a:xfrm>
-            <a:off x="839788" y="1681163"/>
-            <a:ext cx="5157787" cy="823912"/>
+            <a:off x="177053" y="1851635"/>
+            <a:ext cx="5664138" cy="823912"/>
           </a:xfrm>
         </p:spPr>
         <p:txBody>
@@ -1696,44 +1675,44 @@
           <a:p>
             <a:pPr lvl="0"/>
             <a:r>
+              <a:rPr lang="pl-PL" dirty="0"/>
+              <a:t>Kliknij, aby edytować style wzorca tekstu</a:t>
+            </a:r>
+          </a:p>
+        </p:txBody>
+      </p:sp>
+      <p:sp>
+        <p:nvSpPr>
+          <p:cNvPr id="4" name="Symbol zastępczy zawartości 3">
+            <a:extLst>
+              <a:ext uri="{FF2B5EF4-FFF2-40B4-BE49-F238E27FC236}">
+                <a16:creationId xmlns:a16="http://schemas.microsoft.com/office/drawing/2014/main" id="{DB4E6476-8F41-C233-514C-83871D2E7CA5}"/>
+              </a:ext>
+            </a:extLst>
+          </p:cNvPr>
+          <p:cNvSpPr>
+            <a:spLocks noGrp="1"/>
+          </p:cNvSpPr>
+          <p:nvPr>
+            <p:ph sz="half" idx="2"/>
+          </p:nvPr>
+        </p:nvSpPr>
+        <p:spPr>
+          <a:xfrm>
+            <a:off x="177052" y="2688431"/>
+            <a:ext cx="5664138" cy="3497361"/>
+          </a:xfrm>
+        </p:spPr>
+        <p:txBody>
+          <a:bodyPr/>
+          <a:lstStyle/>
+          <a:p>
+            <a:pPr lvl="0"/>
+            <a:r>
               <a:rPr lang="pl-PL"/>
               <a:t>Kliknij, aby edytować style wzorca tekstu</a:t>
             </a:r>
           </a:p>
-        </p:txBody>
-      </p:sp>
-      <p:sp>
-        <p:nvSpPr>
-          <p:cNvPr id="4" name="Symbol zastępczy zawartości 3">
-            <a:extLst>
-              <a:ext uri="{FF2B5EF4-FFF2-40B4-BE49-F238E27FC236}">
-                <a16:creationId xmlns:a16="http://schemas.microsoft.com/office/drawing/2014/main" id="{DB4E6476-8F41-C233-514C-83871D2E7CA5}"/>
-              </a:ext>
-            </a:extLst>
-          </p:cNvPr>
-          <p:cNvSpPr>
-            <a:spLocks noGrp="1"/>
-          </p:cNvSpPr>
-          <p:nvPr>
-            <p:ph sz="half" idx="2"/>
-          </p:nvPr>
-        </p:nvSpPr>
-        <p:spPr>
-          <a:xfrm>
-            <a:off x="839788" y="2505075"/>
-            <a:ext cx="5157787" cy="3684588"/>
-          </a:xfrm>
-        </p:spPr>
-        <p:txBody>
-          <a:bodyPr/>
-          <a:lstStyle/>
-          <a:p>
-            <a:pPr lvl="0"/>
-            <a:r>
-              <a:rPr lang="pl-PL"/>
-              <a:t>Kliknij, aby edytować style wzorca tekstu</a:t>
-            </a:r>
-          </a:p>
           <a:p>
             <a:pPr lvl="1"/>
             <a:r>
@@ -1759,139 +1738,6 @@
             <a:pPr lvl="4"/>
             <a:r>
               <a:rPr lang="pl-PL"/>
-              <a:t>Piąty poziom</a:t>
-            </a:r>
-          </a:p>
-        </p:txBody>
-      </p:sp>
-      <p:sp>
-        <p:nvSpPr>
-          <p:cNvPr id="5" name="Symbol zastępczy tekstu 4">
-            <a:extLst>
-              <a:ext uri="{FF2B5EF4-FFF2-40B4-BE49-F238E27FC236}">
-                <a16:creationId xmlns:a16="http://schemas.microsoft.com/office/drawing/2014/main" id="{D827C515-6A51-A546-C179-CA7C34FA344A}"/>
-              </a:ext>
-            </a:extLst>
-          </p:cNvPr>
-          <p:cNvSpPr>
-            <a:spLocks noGrp="1"/>
-          </p:cNvSpPr>
-          <p:nvPr>
-            <p:ph type="body" sz="quarter" idx="3"/>
-          </p:nvPr>
-        </p:nvSpPr>
-        <p:spPr>
-          <a:xfrm>
-            <a:off x="6172200" y="1681163"/>
-            <a:ext cx="5183188" cy="823912"/>
-          </a:xfrm>
-        </p:spPr>
-        <p:txBody>
-          <a:bodyPr anchor="b"/>
-          <a:lstStyle>
-            <a:lvl1pPr marL="0" indent="0">
-              <a:buNone/>
-              <a:defRPr sz="2400" b="1"/>
-            </a:lvl1pPr>
-            <a:lvl2pPr marL="457200" indent="0">
-              <a:buNone/>
-              <a:defRPr sz="2000" b="1"/>
-            </a:lvl2pPr>
-            <a:lvl3pPr marL="914400" indent="0">
-              <a:buNone/>
-              <a:defRPr sz="1800" b="1"/>
-            </a:lvl3pPr>
-            <a:lvl4pPr marL="1371600" indent="0">
-              <a:buNone/>
-              <a:defRPr sz="1600" b="1"/>
-            </a:lvl4pPr>
-            <a:lvl5pPr marL="1828800" indent="0">
-              <a:buNone/>
-              <a:defRPr sz="1600" b="1"/>
-            </a:lvl5pPr>
-            <a:lvl6pPr marL="2286000" indent="0">
-              <a:buNone/>
-              <a:defRPr sz="1600" b="1"/>
-            </a:lvl6pPr>
-            <a:lvl7pPr marL="2743200" indent="0">
-              <a:buNone/>
-              <a:defRPr sz="1600" b="1"/>
-            </a:lvl7pPr>
-            <a:lvl8pPr marL="3200400" indent="0">
-              <a:buNone/>
-              <a:defRPr sz="1600" b="1"/>
-            </a:lvl8pPr>
-            <a:lvl9pPr marL="3657600" indent="0">
-              <a:buNone/>
-              <a:defRPr sz="1600" b="1"/>
-            </a:lvl9pPr>
-          </a:lstStyle>
-          <a:p>
-            <a:pPr lvl="0"/>
-            <a:r>
-              <a:rPr lang="pl-PL"/>
-              <a:t>Kliknij, aby edytować style wzorca tekstu</a:t>
-            </a:r>
-          </a:p>
-        </p:txBody>
-      </p:sp>
-      <p:sp>
-        <p:nvSpPr>
-          <p:cNvPr id="6" name="Symbol zastępczy zawartości 5">
-            <a:extLst>
-              <a:ext uri="{FF2B5EF4-FFF2-40B4-BE49-F238E27FC236}">
-                <a16:creationId xmlns:a16="http://schemas.microsoft.com/office/drawing/2014/main" id="{0D82DBB4-3996-8A71-F47E-C1539B79747D}"/>
-              </a:ext>
-            </a:extLst>
-          </p:cNvPr>
-          <p:cNvSpPr>
-            <a:spLocks noGrp="1"/>
-          </p:cNvSpPr>
-          <p:nvPr>
-            <p:ph sz="quarter" idx="4"/>
-          </p:nvPr>
-        </p:nvSpPr>
-        <p:spPr>
-          <a:xfrm>
-            <a:off x="6172200" y="2505075"/>
-            <a:ext cx="5183188" cy="3684588"/>
-          </a:xfrm>
-        </p:spPr>
-        <p:txBody>
-          <a:bodyPr/>
-          <a:lstStyle/>
-          <a:p>
-            <a:pPr lvl="0"/>
-            <a:r>
-              <a:rPr lang="pl-PL" dirty="0"/>
-              <a:t>Kliknij, aby edytować style wzorca tekstu</a:t>
-            </a:r>
-          </a:p>
-          <a:p>
-            <a:pPr lvl="1"/>
-            <a:r>
-              <a:rPr lang="pl-PL" dirty="0"/>
-              <a:t>Drugi poziom</a:t>
-            </a:r>
-          </a:p>
-          <a:p>
-            <a:pPr lvl="2"/>
-            <a:r>
-              <a:rPr lang="pl-PL" dirty="0"/>
-              <a:t>Trzeci poziom</a:t>
-            </a:r>
-          </a:p>
-          <a:p>
-            <a:pPr lvl="3"/>
-            <a:r>
-              <a:rPr lang="pl-PL" dirty="0"/>
-              <a:t>Czwarty poziom</a:t>
-            </a:r>
-          </a:p>
-          <a:p>
-            <a:pPr lvl="4"/>
-            <a:r>
-              <a:rPr lang="pl-PL" dirty="0"/>
               <a:t>Piąty poziom</a:t>
             </a:r>
           </a:p>
@@ -1977,6 +1823,181 @@
               <a:t>‹#›</a:t>
             </a:fld>
             <a:endParaRPr lang="pl-PL"/>
+          </a:p>
+        </p:txBody>
+      </p:sp>
+      <p:sp>
+        <p:nvSpPr>
+          <p:cNvPr id="10" name="Symbol zastępczy tytułu 1">
+            <a:extLst>
+              <a:ext uri="{FF2B5EF4-FFF2-40B4-BE49-F238E27FC236}">
+                <a16:creationId xmlns:a16="http://schemas.microsoft.com/office/drawing/2014/main" id="{81BBBA64-3D52-B7E5-F878-07D501FD8998}"/>
+              </a:ext>
+            </a:extLst>
+          </p:cNvPr>
+          <p:cNvSpPr>
+            <a:spLocks noGrp="1"/>
+          </p:cNvSpPr>
+          <p:nvPr>
+            <p:ph type="title" hasCustomPrompt="1"/>
+          </p:nvPr>
+        </p:nvSpPr>
+        <p:spPr>
+          <a:xfrm>
+            <a:off x="177053" y="136525"/>
+            <a:ext cx="11837894" cy="1325563"/>
+          </a:xfrm>
+          <a:prstGeom prst="rect">
+            <a:avLst/>
+          </a:prstGeom>
+        </p:spPr>
+        <p:txBody>
+          <a:bodyPr vert="horz" lIns="91440" tIns="45720" rIns="91440" bIns="45720" rtlCol="0" anchor="ctr">
+            <a:noAutofit/>
+          </a:bodyPr>
+          <a:lstStyle>
+            <a:lvl1pPr>
+              <a:defRPr/>
+            </a:lvl1pPr>
+          </a:lstStyle>
+          <a:p>
+            <a:r>
+              <a:rPr lang="pl-PL" dirty="0"/>
+              <a:t>TYTUL SEKCJI – C </a:t>
+            </a:r>
+          </a:p>
+        </p:txBody>
+      </p:sp>
+      <p:sp>
+        <p:nvSpPr>
+          <p:cNvPr id="17" name="Symbol zastępczy tekstu 2">
+            <a:extLst>
+              <a:ext uri="{FF2B5EF4-FFF2-40B4-BE49-F238E27FC236}">
+                <a16:creationId xmlns:a16="http://schemas.microsoft.com/office/drawing/2014/main" id="{F8E9A198-08CC-B5A5-7383-FCF07D53D70A}"/>
+              </a:ext>
+            </a:extLst>
+          </p:cNvPr>
+          <p:cNvSpPr>
+            <a:spLocks noGrp="1"/>
+          </p:cNvSpPr>
+          <p:nvPr>
+            <p:ph type="body" idx="13"/>
+          </p:nvPr>
+        </p:nvSpPr>
+        <p:spPr>
+          <a:xfrm>
+            <a:off x="6350809" y="1851635"/>
+            <a:ext cx="5664138" cy="823912"/>
+          </a:xfrm>
+        </p:spPr>
+        <p:txBody>
+          <a:bodyPr anchor="b"/>
+          <a:lstStyle>
+            <a:lvl1pPr marL="0" indent="0">
+              <a:buNone/>
+              <a:defRPr sz="2400" b="1"/>
+            </a:lvl1pPr>
+            <a:lvl2pPr marL="457200" indent="0">
+              <a:buNone/>
+              <a:defRPr sz="2000" b="1"/>
+            </a:lvl2pPr>
+            <a:lvl3pPr marL="914400" indent="0">
+              <a:buNone/>
+              <a:defRPr sz="1800" b="1"/>
+            </a:lvl3pPr>
+            <a:lvl4pPr marL="1371600" indent="0">
+              <a:buNone/>
+              <a:defRPr sz="1600" b="1"/>
+            </a:lvl4pPr>
+            <a:lvl5pPr marL="1828800" indent="0">
+              <a:buNone/>
+              <a:defRPr sz="1600" b="1"/>
+            </a:lvl5pPr>
+            <a:lvl6pPr marL="2286000" indent="0">
+              <a:buNone/>
+              <a:defRPr sz="1600" b="1"/>
+            </a:lvl6pPr>
+            <a:lvl7pPr marL="2743200" indent="0">
+              <a:buNone/>
+              <a:defRPr sz="1600" b="1"/>
+            </a:lvl7pPr>
+            <a:lvl8pPr marL="3200400" indent="0">
+              <a:buNone/>
+              <a:defRPr sz="1600" b="1"/>
+            </a:lvl8pPr>
+            <a:lvl9pPr marL="3657600" indent="0">
+              <a:buNone/>
+              <a:defRPr sz="1600" b="1"/>
+            </a:lvl9pPr>
+          </a:lstStyle>
+          <a:p>
+            <a:pPr lvl="0"/>
+            <a:r>
+              <a:rPr lang="pl-PL" dirty="0"/>
+              <a:t>Kliknij, aby edytować style wzorca tekstu</a:t>
+            </a:r>
+          </a:p>
+        </p:txBody>
+      </p:sp>
+      <p:sp>
+        <p:nvSpPr>
+          <p:cNvPr id="18" name="Symbol zastępczy zawartości 3">
+            <a:extLst>
+              <a:ext uri="{FF2B5EF4-FFF2-40B4-BE49-F238E27FC236}">
+                <a16:creationId xmlns:a16="http://schemas.microsoft.com/office/drawing/2014/main" id="{F55AF0FB-93AC-FF1C-4080-7C452732BCB3}"/>
+              </a:ext>
+            </a:extLst>
+          </p:cNvPr>
+          <p:cNvSpPr>
+            <a:spLocks noGrp="1"/>
+          </p:cNvSpPr>
+          <p:nvPr>
+            <p:ph sz="half" idx="14"/>
+          </p:nvPr>
+        </p:nvSpPr>
+        <p:spPr>
+          <a:xfrm>
+            <a:off x="6350808" y="2688431"/>
+            <a:ext cx="5664138" cy="3497361"/>
+          </a:xfrm>
+        </p:spPr>
+        <p:txBody>
+          <a:bodyPr/>
+          <a:lstStyle/>
+          <a:p>
+            <a:pPr lvl="0"/>
+            <a:r>
+              <a:rPr lang="pl-PL"/>
+              <a:t>Kliknij, aby edytować style wzorca tekstu</a:t>
+            </a:r>
+          </a:p>
+          <a:p>
+            <a:pPr lvl="1"/>
+            <a:r>
+              <a:rPr lang="pl-PL"/>
+              <a:t>Drugi poziom</a:t>
+            </a:r>
+          </a:p>
+          <a:p>
+            <a:pPr lvl="2"/>
+            <a:r>
+              <a:rPr lang="pl-PL"/>
+              <a:t>Trzeci poziom</a:t>
+            </a:r>
+          </a:p>
+          <a:p>
+            <a:pPr lvl="3"/>
+            <a:r>
+              <a:rPr lang="pl-PL"/>
+              <a:t>Czwarty poziom</a:t>
+            </a:r>
+          </a:p>
+          <a:p>
+            <a:pPr lvl="4"/>
+            <a:r>
+              <a:rPr lang="pl-PL"/>
+              <a:t>Piąty poziom</a:t>
+            </a:r>
           </a:p>
         </p:txBody>
       </p:sp>
@@ -2949,8 +2970,8 @@
         </p:nvSpPr>
         <p:spPr>
           <a:xfrm>
-            <a:off x="838200" y="365125"/>
-            <a:ext cx="10515600" cy="1325563"/>
+            <a:off x="177053" y="136525"/>
+            <a:ext cx="11837894" cy="1325563"/>
           </a:xfrm>
           <a:prstGeom prst="rect">
             <a:avLst/>
@@ -2958,13 +2979,13 @@
         </p:spPr>
         <p:txBody>
           <a:bodyPr vert="horz" lIns="91440" tIns="45720" rIns="91440" bIns="45720" rtlCol="0" anchor="ctr">
-            <a:normAutofit/>
+            <a:noAutofit/>
           </a:bodyPr>
           <a:lstStyle/>
           <a:p>
             <a:r>
               <a:rPr lang="pl-PL" dirty="0"/>
-              <a:t>Kliknij, aby edytować styl</a:t>
+              <a:t>Tytuł – ogólny slajd</a:t>
             </a:r>
           </a:p>
         </p:txBody>
@@ -2987,8 +3008,8 @@
         </p:nvSpPr>
         <p:spPr>
           <a:xfrm>
-            <a:off x="838200" y="1825625"/>
-            <a:ext cx="10515600" cy="4351338"/>
+            <a:off x="372035" y="1881246"/>
+            <a:ext cx="6632388" cy="4351338"/>
           </a:xfrm>
           <a:prstGeom prst="rect">
             <a:avLst/>
@@ -3251,7 +3272,7 @@
           <a:spcPct val="0"/>
         </a:spcBef>
         <a:buNone/>
-        <a:defRPr sz="4400" kern="1200">
+        <a:defRPr sz="6600" kern="1200">
           <a:solidFill>
             <a:schemeClr val="bg1"/>
           </a:solidFill>

</xml_diff>